<commit_message>
8.01 typo in sildes4f
</commit_message>
<xml_diff>
--- a/restricted/slides4f.pptx
+++ b/restricted/slides4f.pptx
@@ -267,7 +267,7 @@
             <a:fld id="{7E67CB53-8D3C-47BE-A7FA-F662C961B657}" type="datetimeFigureOut">
               <a:rPr lang="en-US" smtClean="0"/>
               <a:pPr/>
-              <a:t>2/16/10</a:t>
+              <a:t>2/26/10</a:t>
             </a:fld>
             <a:endParaRPr lang="en-US"/>
           </a:p>
@@ -429,7 +429,7 @@
             <a:fld id="{EFF6E4C5-D825-46D1-9B47-4B12017997CB}" type="datetimeFigureOut">
               <a:rPr lang="en-US" smtClean="0"/>
               <a:pPr/>
-              <a:t>2/16/10</a:t>
+              <a:t>2/26/10</a:t>
             </a:fld>
             <a:endParaRPr lang="en-US"/>
           </a:p>
@@ -4932,22 +4932,7 @@
                 <a:uFillTx/>
                 <a:latin typeface="Comic Sans MS" pitchFamily="66" charset="0"/>
               </a:rPr>
-              <a:t>Albert R </a:t>
-            </a:r>
-            <a:r>
-              <a:rPr kumimoji="0" lang="en-US" sz="1200" b="0" i="0" u="none" strike="noStrike" kern="1200" cap="none" spc="0" normalizeH="0" baseline="0" noProof="0" dirty="0" smtClean="0">
-                <a:ln>
-                  <a:noFill/>
-                </a:ln>
-                <a:solidFill>
-                  <a:schemeClr val="tx1"/>
-                </a:solidFill>
-                <a:effectLst/>
-                <a:uLnTx/>
-                <a:uFillTx/>
-                <a:latin typeface="Comic Sans MS" pitchFamily="66" charset="0"/>
-              </a:rPr>
-              <a:t>Meyer,       Feb. 26. 2010</a:t>
+              <a:t>Albert R Meyer,       Feb. 26. 2010</a:t>
             </a:r>
             <a:endParaRPr kumimoji="0" lang="en-US" sz="1200" b="0" i="0" u="none" strike="noStrike" kern="1200" cap="none" spc="0" normalizeH="0" baseline="0" noProof="0" dirty="0">
               <a:ln>
@@ -29077,11 +29062,14 @@
                 </a:spcBef>
               </a:pPr>
               <a:r>
-                <a:rPr lang="en-US" sz="2400" dirty="0">
+                <a:rPr lang="en-US" sz="2400" dirty="0" smtClean="0">
                   <a:latin typeface="Comic Sans MS" pitchFamily="66" charset="0"/>
                 </a:rPr>
-                <a:t>8.01</a:t>
+                <a:t>8.02</a:t>
               </a:r>
+              <a:endParaRPr lang="en-US" sz="2400" dirty="0">
+                <a:latin typeface="Comic Sans MS" pitchFamily="66" charset="0"/>
+              </a:endParaRPr>
             </a:p>
           </p:txBody>
         </p:sp>
@@ -30026,11 +30014,14 @@
                 </a:spcBef>
               </a:pPr>
               <a:r>
-                <a:rPr lang="en-US" sz="2400" dirty="0">
+                <a:rPr lang="en-US" sz="2400" dirty="0" smtClean="0">
                   <a:latin typeface="Comic Sans MS" pitchFamily="66" charset="0"/>
                 </a:rPr>
-                <a:t>8.01</a:t>
+                <a:t>8.02</a:t>
               </a:r>
+              <a:endParaRPr lang="en-US" sz="2400" dirty="0">
+                <a:latin typeface="Comic Sans MS" pitchFamily="66" charset="0"/>
+              </a:endParaRPr>
             </a:p>
           </p:txBody>
         </p:sp>

</xml_diff>